<commit_message>
Wires to AMP board
</commit_message>
<xml_diff>
--- a/Docs/Connections.pptx
+++ b/Docs/Connections.pptx
@@ -104,6 +104,11 @@
       </a:defRPr>
     </a:lvl9pPr>
   </p:defaultTextStyle>
+  <p:extLst>
+    <p:ext uri="{EFAFB233-063F-42B5-8137-9DF3F51BA10A}">
+      <p15:sldGuideLst xmlns:p15="http://schemas.microsoft.com/office/powerpoint/2012/main"/>
+    </p:ext>
+  </p:extLst>
 </p:presentation>
 </file>
 
@@ -254,7 +259,7 @@
           <a:p>
             <a:fld id="{23EEFCD7-205C-4C47-9A48-AAE30785E336}" type="datetimeFigureOut">
               <a:rPr lang="en-US" smtClean="0"/>
-              <a:t>10/25/2021</a:t>
+              <a:t>11/11/2021</a:t>
             </a:fld>
             <a:endParaRPr lang="en-US"/>
           </a:p>
@@ -452,7 +457,7 @@
           <a:p>
             <a:fld id="{23EEFCD7-205C-4C47-9A48-AAE30785E336}" type="datetimeFigureOut">
               <a:rPr lang="en-US" smtClean="0"/>
-              <a:t>10/25/2021</a:t>
+              <a:t>11/11/2021</a:t>
             </a:fld>
             <a:endParaRPr lang="en-US"/>
           </a:p>
@@ -660,7 +665,7 @@
           <a:p>
             <a:fld id="{23EEFCD7-205C-4C47-9A48-AAE30785E336}" type="datetimeFigureOut">
               <a:rPr lang="en-US" smtClean="0"/>
-              <a:t>10/25/2021</a:t>
+              <a:t>11/11/2021</a:t>
             </a:fld>
             <a:endParaRPr lang="en-US"/>
           </a:p>
@@ -858,7 +863,7 @@
           <a:p>
             <a:fld id="{23EEFCD7-205C-4C47-9A48-AAE30785E336}" type="datetimeFigureOut">
               <a:rPr lang="en-US" smtClean="0"/>
-              <a:t>10/25/2021</a:t>
+              <a:t>11/11/2021</a:t>
             </a:fld>
             <a:endParaRPr lang="en-US"/>
           </a:p>
@@ -1133,7 +1138,7 @@
           <a:p>
             <a:fld id="{23EEFCD7-205C-4C47-9A48-AAE30785E336}" type="datetimeFigureOut">
               <a:rPr lang="en-US" smtClean="0"/>
-              <a:t>10/25/2021</a:t>
+              <a:t>11/11/2021</a:t>
             </a:fld>
             <a:endParaRPr lang="en-US"/>
           </a:p>
@@ -1398,7 +1403,7 @@
           <a:p>
             <a:fld id="{23EEFCD7-205C-4C47-9A48-AAE30785E336}" type="datetimeFigureOut">
               <a:rPr lang="en-US" smtClean="0"/>
-              <a:t>10/25/2021</a:t>
+              <a:t>11/11/2021</a:t>
             </a:fld>
             <a:endParaRPr lang="en-US"/>
           </a:p>
@@ -1810,7 +1815,7 @@
           <a:p>
             <a:fld id="{23EEFCD7-205C-4C47-9A48-AAE30785E336}" type="datetimeFigureOut">
               <a:rPr lang="en-US" smtClean="0"/>
-              <a:t>10/25/2021</a:t>
+              <a:t>11/11/2021</a:t>
             </a:fld>
             <a:endParaRPr lang="en-US"/>
           </a:p>
@@ -1951,7 +1956,7 @@
           <a:p>
             <a:fld id="{23EEFCD7-205C-4C47-9A48-AAE30785E336}" type="datetimeFigureOut">
               <a:rPr lang="en-US" smtClean="0"/>
-              <a:t>10/25/2021</a:t>
+              <a:t>11/11/2021</a:t>
             </a:fld>
             <a:endParaRPr lang="en-US"/>
           </a:p>
@@ -2064,7 +2069,7 @@
           <a:p>
             <a:fld id="{23EEFCD7-205C-4C47-9A48-AAE30785E336}" type="datetimeFigureOut">
               <a:rPr lang="en-US" smtClean="0"/>
-              <a:t>10/25/2021</a:t>
+              <a:t>11/11/2021</a:t>
             </a:fld>
             <a:endParaRPr lang="en-US"/>
           </a:p>
@@ -2375,7 +2380,7 @@
           <a:p>
             <a:fld id="{23EEFCD7-205C-4C47-9A48-AAE30785E336}" type="datetimeFigureOut">
               <a:rPr lang="en-US" smtClean="0"/>
-              <a:t>10/25/2021</a:t>
+              <a:t>11/11/2021</a:t>
             </a:fld>
             <a:endParaRPr lang="en-US"/>
           </a:p>
@@ -2663,7 +2668,7 @@
           <a:p>
             <a:fld id="{23EEFCD7-205C-4C47-9A48-AAE30785E336}" type="datetimeFigureOut">
               <a:rPr lang="en-US" smtClean="0"/>
-              <a:t>10/25/2021</a:t>
+              <a:t>11/11/2021</a:t>
             </a:fld>
             <a:endParaRPr lang="en-US"/>
           </a:p>
@@ -2904,7 +2909,7 @@
           <a:p>
             <a:fld id="{23EEFCD7-205C-4C47-9A48-AAE30785E336}" type="datetimeFigureOut">
               <a:rPr lang="en-US" smtClean="0"/>
-              <a:t>10/25/2021</a:t>
+              <a:t>11/11/2021</a:t>
             </a:fld>
             <a:endParaRPr lang="en-US"/>
           </a:p>
@@ -4567,182 +4572,6 @@
       </p:cxnSp>
       <p:sp>
         <p:nvSpPr>
-          <p:cNvPr id="69" name="Freeform: Shape 68">
-            <a:extLst>
-              <a:ext uri="{FF2B5EF4-FFF2-40B4-BE49-F238E27FC236}">
-                <a16:creationId xmlns:a16="http://schemas.microsoft.com/office/drawing/2014/main" id="{6CAD8A63-077A-4877-A628-7489771E7A7E}"/>
-              </a:ext>
-            </a:extLst>
-          </p:cNvPr>
-          <p:cNvSpPr/>
-          <p:nvPr/>
-        </p:nvSpPr>
-        <p:spPr>
-          <a:xfrm>
-            <a:off x="1470551" y="2986088"/>
-            <a:ext cx="372537" cy="1919287"/>
-          </a:xfrm>
-          <a:custGeom>
-            <a:avLst/>
-            <a:gdLst>
-              <a:gd name="connsiteX0" fmla="*/ 282049 w 372537"/>
-              <a:gd name="connsiteY0" fmla="*/ 0 h 1919287"/>
-              <a:gd name="connsiteX1" fmla="*/ 1062 w 372537"/>
-              <a:gd name="connsiteY1" fmla="*/ 1038225 h 1919287"/>
-              <a:gd name="connsiteX2" fmla="*/ 372537 w 372537"/>
-              <a:gd name="connsiteY2" fmla="*/ 1919287 h 1919287"/>
-            </a:gdLst>
-            <a:ahLst/>
-            <a:cxnLst>
-              <a:cxn ang="0">
-                <a:pos x="connsiteX0" y="connsiteY0"/>
-              </a:cxn>
-              <a:cxn ang="0">
-                <a:pos x="connsiteX1" y="connsiteY1"/>
-              </a:cxn>
-              <a:cxn ang="0">
-                <a:pos x="connsiteX2" y="connsiteY2"/>
-              </a:cxn>
-            </a:cxnLst>
-            <a:rect l="l" t="t" r="r" b="b"/>
-            <a:pathLst>
-              <a:path w="372537" h="1919287">
-                <a:moveTo>
-                  <a:pt x="282049" y="0"/>
-                </a:moveTo>
-                <a:cubicBezTo>
-                  <a:pt x="134015" y="359172"/>
-                  <a:pt x="-14019" y="718344"/>
-                  <a:pt x="1062" y="1038225"/>
-                </a:cubicBezTo>
-                <a:cubicBezTo>
-                  <a:pt x="16143" y="1358106"/>
-                  <a:pt x="309037" y="1790700"/>
-                  <a:pt x="372537" y="1919287"/>
-                </a:cubicBezTo>
-              </a:path>
-            </a:pathLst>
-          </a:custGeom>
-          <a:noFill/>
-          <a:ln w="38100"/>
-        </p:spPr>
-        <p:style>
-          <a:lnRef idx="2">
-            <a:schemeClr val="accent1">
-              <a:shade val="50000"/>
-            </a:schemeClr>
-          </a:lnRef>
-          <a:fillRef idx="1">
-            <a:schemeClr val="accent1"/>
-          </a:fillRef>
-          <a:effectRef idx="0">
-            <a:schemeClr val="accent1"/>
-          </a:effectRef>
-          <a:fontRef idx="minor">
-            <a:schemeClr val="lt1"/>
-          </a:fontRef>
-        </p:style>
-        <p:txBody>
-          <a:bodyPr rtlCol="0" anchor="ctr"/>
-          <a:lstStyle/>
-          <a:p>
-            <a:pPr algn="ctr"/>
-            <a:endParaRPr lang="en-US"/>
-          </a:p>
-        </p:txBody>
-      </p:sp>
-      <p:sp>
-        <p:nvSpPr>
-          <p:cNvPr id="70" name="Freeform: Shape 69">
-            <a:extLst>
-              <a:ext uri="{FF2B5EF4-FFF2-40B4-BE49-F238E27FC236}">
-                <a16:creationId xmlns:a16="http://schemas.microsoft.com/office/drawing/2014/main" id="{1239DD3A-FDD4-4542-82C9-A7681291F641}"/>
-              </a:ext>
-            </a:extLst>
-          </p:cNvPr>
-          <p:cNvSpPr/>
-          <p:nvPr/>
-        </p:nvSpPr>
-        <p:spPr>
-          <a:xfrm>
-            <a:off x="1779020" y="2986088"/>
-            <a:ext cx="654618" cy="1919287"/>
-          </a:xfrm>
-          <a:custGeom>
-            <a:avLst/>
-            <a:gdLst>
-              <a:gd name="connsiteX0" fmla="*/ 92643 w 654618"/>
-              <a:gd name="connsiteY0" fmla="*/ 0 h 1919287"/>
-              <a:gd name="connsiteX1" fmla="*/ 45018 w 654618"/>
-              <a:gd name="connsiteY1" fmla="*/ 1176337 h 1919287"/>
-              <a:gd name="connsiteX2" fmla="*/ 654618 w 654618"/>
-              <a:gd name="connsiteY2" fmla="*/ 1919287 h 1919287"/>
-            </a:gdLst>
-            <a:ahLst/>
-            <a:cxnLst>
-              <a:cxn ang="0">
-                <a:pos x="connsiteX0" y="connsiteY0"/>
-              </a:cxn>
-              <a:cxn ang="0">
-                <a:pos x="connsiteX1" y="connsiteY1"/>
-              </a:cxn>
-              <a:cxn ang="0">
-                <a:pos x="connsiteX2" y="connsiteY2"/>
-              </a:cxn>
-            </a:cxnLst>
-            <a:rect l="l" t="t" r="r" b="b"/>
-            <a:pathLst>
-              <a:path w="654618" h="1919287">
-                <a:moveTo>
-                  <a:pt x="92643" y="0"/>
-                </a:moveTo>
-                <a:cubicBezTo>
-                  <a:pt x="21999" y="428228"/>
-                  <a:pt x="-48644" y="856456"/>
-                  <a:pt x="45018" y="1176337"/>
-                </a:cubicBezTo>
-                <a:cubicBezTo>
-                  <a:pt x="138680" y="1496218"/>
-                  <a:pt x="552224" y="1799431"/>
-                  <a:pt x="654618" y="1919287"/>
-                </a:cubicBezTo>
-              </a:path>
-            </a:pathLst>
-          </a:custGeom>
-          <a:noFill/>
-          <a:ln w="38100">
-            <a:solidFill>
-              <a:srgbClr val="FFC000"/>
-            </a:solidFill>
-          </a:ln>
-        </p:spPr>
-        <p:style>
-          <a:lnRef idx="2">
-            <a:schemeClr val="accent1">
-              <a:shade val="50000"/>
-            </a:schemeClr>
-          </a:lnRef>
-          <a:fillRef idx="1">
-            <a:schemeClr val="accent1"/>
-          </a:fillRef>
-          <a:effectRef idx="0">
-            <a:schemeClr val="accent1"/>
-          </a:effectRef>
-          <a:fontRef idx="minor">
-            <a:schemeClr val="lt1"/>
-          </a:fontRef>
-        </p:style>
-        <p:txBody>
-          <a:bodyPr rtlCol="0" anchor="ctr"/>
-          <a:lstStyle/>
-          <a:p>
-            <a:pPr algn="ctr"/>
-            <a:endParaRPr lang="en-US"/>
-          </a:p>
-        </p:txBody>
-      </p:sp>
-      <p:sp>
-        <p:nvSpPr>
           <p:cNvPr id="74" name="Freeform: Shape 73">
             <a:extLst>
               <a:ext uri="{FF2B5EF4-FFF2-40B4-BE49-F238E27FC236}">
@@ -5022,6 +4851,371 @@
           </a:fontRef>
         </p:style>
       </p:cxnSp>
+      <p:sp>
+        <p:nvSpPr>
+          <p:cNvPr id="2" name="Freeform: Shape 1">
+            <a:extLst>
+              <a:ext uri="{FF2B5EF4-FFF2-40B4-BE49-F238E27FC236}">
+                <a16:creationId xmlns:a16="http://schemas.microsoft.com/office/drawing/2014/main" id="{793C7701-AB14-4862-9F37-AD00E010A5DA}"/>
+              </a:ext>
+            </a:extLst>
+          </p:cNvPr>
+          <p:cNvSpPr/>
+          <p:nvPr/>
+        </p:nvSpPr>
+        <p:spPr>
+          <a:xfrm>
+            <a:off x="1866900" y="2918460"/>
+            <a:ext cx="2575560" cy="370828"/>
+          </a:xfrm>
+          <a:custGeom>
+            <a:avLst/>
+            <a:gdLst>
+              <a:gd name="connsiteX0" fmla="*/ 0 w 2575560"/>
+              <a:gd name="connsiteY0" fmla="*/ 76200 h 370828"/>
+              <a:gd name="connsiteX1" fmla="*/ 1097280 w 2575560"/>
+              <a:gd name="connsiteY1" fmla="*/ 320040 h 370828"/>
+              <a:gd name="connsiteX2" fmla="*/ 2286000 w 2575560"/>
+              <a:gd name="connsiteY2" fmla="*/ 342900 h 370828"/>
+              <a:gd name="connsiteX3" fmla="*/ 2575560 w 2575560"/>
+              <a:gd name="connsiteY3" fmla="*/ 0 h 370828"/>
+            </a:gdLst>
+            <a:ahLst/>
+            <a:cxnLst>
+              <a:cxn ang="0">
+                <a:pos x="connsiteX0" y="connsiteY0"/>
+              </a:cxn>
+              <a:cxn ang="0">
+                <a:pos x="connsiteX1" y="connsiteY1"/>
+              </a:cxn>
+              <a:cxn ang="0">
+                <a:pos x="connsiteX2" y="connsiteY2"/>
+              </a:cxn>
+              <a:cxn ang="0">
+                <a:pos x="connsiteX3" y="connsiteY3"/>
+              </a:cxn>
+            </a:cxnLst>
+            <a:rect l="l" t="t" r="r" b="b"/>
+            <a:pathLst>
+              <a:path w="2575560" h="370828">
+                <a:moveTo>
+                  <a:pt x="0" y="76200"/>
+                </a:moveTo>
+                <a:cubicBezTo>
+                  <a:pt x="358140" y="175895"/>
+                  <a:pt x="716280" y="275590"/>
+                  <a:pt x="1097280" y="320040"/>
+                </a:cubicBezTo>
+                <a:cubicBezTo>
+                  <a:pt x="1478280" y="364490"/>
+                  <a:pt x="2039620" y="396240"/>
+                  <a:pt x="2286000" y="342900"/>
+                </a:cubicBezTo>
+                <a:cubicBezTo>
+                  <a:pt x="2532380" y="289560"/>
+                  <a:pt x="2553970" y="144780"/>
+                  <a:pt x="2575560" y="0"/>
+                </a:cubicBezTo>
+              </a:path>
+            </a:pathLst>
+          </a:custGeom>
+          <a:ln w="38100"/>
+        </p:spPr>
+        <p:style>
+          <a:lnRef idx="3">
+            <a:schemeClr val="accent4"/>
+          </a:lnRef>
+          <a:fillRef idx="0">
+            <a:schemeClr val="accent4"/>
+          </a:fillRef>
+          <a:effectRef idx="2">
+            <a:schemeClr val="accent4"/>
+          </a:effectRef>
+          <a:fontRef idx="minor">
+            <a:schemeClr val="tx1"/>
+          </a:fontRef>
+        </p:style>
+        <p:txBody>
+          <a:bodyPr rtlCol="0" anchor="ctr"/>
+          <a:lstStyle/>
+          <a:p>
+            <a:pPr algn="ctr"/>
+            <a:endParaRPr lang="en-US"/>
+          </a:p>
+        </p:txBody>
+      </p:sp>
+      <p:sp>
+        <p:nvSpPr>
+          <p:cNvPr id="4" name="Freeform: Shape 3">
+            <a:extLst>
+              <a:ext uri="{FF2B5EF4-FFF2-40B4-BE49-F238E27FC236}">
+                <a16:creationId xmlns:a16="http://schemas.microsoft.com/office/drawing/2014/main" id="{D905C42D-04E2-498F-8915-AFC0603B4A93}"/>
+              </a:ext>
+            </a:extLst>
+          </p:cNvPr>
+          <p:cNvSpPr/>
+          <p:nvPr/>
+        </p:nvSpPr>
+        <p:spPr>
+          <a:xfrm>
+            <a:off x="2242051" y="2926080"/>
+            <a:ext cx="2063249" cy="1973580"/>
+          </a:xfrm>
+          <a:custGeom>
+            <a:avLst/>
+            <a:gdLst>
+              <a:gd name="connsiteX0" fmla="*/ 2063249 w 2063249"/>
+              <a:gd name="connsiteY0" fmla="*/ 0 h 1973580"/>
+              <a:gd name="connsiteX1" fmla="*/ 181109 w 2063249"/>
+              <a:gd name="connsiteY1" fmla="*/ 1257300 h 1973580"/>
+              <a:gd name="connsiteX2" fmla="*/ 181109 w 2063249"/>
+              <a:gd name="connsiteY2" fmla="*/ 1973580 h 1973580"/>
+            </a:gdLst>
+            <a:ahLst/>
+            <a:cxnLst>
+              <a:cxn ang="0">
+                <a:pos x="connsiteX0" y="connsiteY0"/>
+              </a:cxn>
+              <a:cxn ang="0">
+                <a:pos x="connsiteX1" y="connsiteY1"/>
+              </a:cxn>
+              <a:cxn ang="0">
+                <a:pos x="connsiteX2" y="connsiteY2"/>
+              </a:cxn>
+            </a:cxnLst>
+            <a:rect l="l" t="t" r="r" b="b"/>
+            <a:pathLst>
+              <a:path w="2063249" h="1973580">
+                <a:moveTo>
+                  <a:pt x="2063249" y="0"/>
+                </a:moveTo>
+                <a:cubicBezTo>
+                  <a:pt x="1279024" y="464185"/>
+                  <a:pt x="494799" y="928370"/>
+                  <a:pt x="181109" y="1257300"/>
+                </a:cubicBezTo>
+                <a:cubicBezTo>
+                  <a:pt x="-132581" y="1586230"/>
+                  <a:pt x="24264" y="1779905"/>
+                  <a:pt x="181109" y="1973580"/>
+                </a:cubicBezTo>
+              </a:path>
+            </a:pathLst>
+          </a:custGeom>
+          <a:ln w="38100">
+            <a:solidFill>
+              <a:srgbClr val="92D050"/>
+            </a:solidFill>
+          </a:ln>
+        </p:spPr>
+        <p:style>
+          <a:lnRef idx="1">
+            <a:schemeClr val="accent2"/>
+          </a:lnRef>
+          <a:fillRef idx="0">
+            <a:schemeClr val="accent2"/>
+          </a:fillRef>
+          <a:effectRef idx="0">
+            <a:schemeClr val="accent2"/>
+          </a:effectRef>
+          <a:fontRef idx="minor">
+            <a:schemeClr val="tx1"/>
+          </a:fontRef>
+        </p:style>
+        <p:txBody>
+          <a:bodyPr rtlCol="0" anchor="ctr"/>
+          <a:lstStyle/>
+          <a:p>
+            <a:pPr algn="ctr"/>
+            <a:endParaRPr lang="en-US"/>
+          </a:p>
+        </p:txBody>
+      </p:sp>
+      <p:sp>
+        <p:nvSpPr>
+          <p:cNvPr id="6" name="Freeform: Shape 5">
+            <a:extLst>
+              <a:ext uri="{FF2B5EF4-FFF2-40B4-BE49-F238E27FC236}">
+                <a16:creationId xmlns:a16="http://schemas.microsoft.com/office/drawing/2014/main" id="{2AB7743B-DC55-4FA0-8D99-A34FDB0164EB}"/>
+              </a:ext>
+            </a:extLst>
+          </p:cNvPr>
+          <p:cNvSpPr/>
+          <p:nvPr/>
+        </p:nvSpPr>
+        <p:spPr>
+          <a:xfrm>
+            <a:off x="1744980" y="2987040"/>
+            <a:ext cx="2560320" cy="1394230"/>
+          </a:xfrm>
+          <a:custGeom>
+            <a:avLst/>
+            <a:gdLst>
+              <a:gd name="connsiteX0" fmla="*/ 0 w 2560320"/>
+              <a:gd name="connsiteY0" fmla="*/ 0 h 1394230"/>
+              <a:gd name="connsiteX1" fmla="*/ 1836420 w 2560320"/>
+              <a:gd name="connsiteY1" fmla="*/ 1257300 h 1394230"/>
+              <a:gd name="connsiteX2" fmla="*/ 2560320 w 2560320"/>
+              <a:gd name="connsiteY2" fmla="*/ 1303020 h 1394230"/>
+            </a:gdLst>
+            <a:ahLst/>
+            <a:cxnLst>
+              <a:cxn ang="0">
+                <a:pos x="connsiteX0" y="connsiteY0"/>
+              </a:cxn>
+              <a:cxn ang="0">
+                <a:pos x="connsiteX1" y="connsiteY1"/>
+              </a:cxn>
+              <a:cxn ang="0">
+                <a:pos x="connsiteX2" y="connsiteY2"/>
+              </a:cxn>
+            </a:cxnLst>
+            <a:rect l="l" t="t" r="r" b="b"/>
+            <a:pathLst>
+              <a:path w="2560320" h="1394230">
+                <a:moveTo>
+                  <a:pt x="0" y="0"/>
+                </a:moveTo>
+                <a:cubicBezTo>
+                  <a:pt x="704850" y="520065"/>
+                  <a:pt x="1409700" y="1040130"/>
+                  <a:pt x="1836420" y="1257300"/>
+                </a:cubicBezTo>
+                <a:cubicBezTo>
+                  <a:pt x="2263140" y="1474470"/>
+                  <a:pt x="2411730" y="1388745"/>
+                  <a:pt x="2560320" y="1303020"/>
+                </a:cubicBezTo>
+              </a:path>
+            </a:pathLst>
+          </a:custGeom>
+          <a:noFill/>
+          <a:ln w="38100">
+            <a:solidFill>
+              <a:schemeClr val="accent5">
+                <a:lumMod val="50000"/>
+              </a:schemeClr>
+            </a:solidFill>
+          </a:ln>
+        </p:spPr>
+        <p:style>
+          <a:lnRef idx="2">
+            <a:schemeClr val="accent1">
+              <a:shade val="50000"/>
+            </a:schemeClr>
+          </a:lnRef>
+          <a:fillRef idx="1">
+            <a:schemeClr val="accent1"/>
+          </a:fillRef>
+          <a:effectRef idx="0">
+            <a:schemeClr val="accent1"/>
+          </a:effectRef>
+          <a:fontRef idx="minor">
+            <a:schemeClr val="lt1"/>
+          </a:fontRef>
+        </p:style>
+        <p:txBody>
+          <a:bodyPr rtlCol="0" anchor="ctr"/>
+          <a:lstStyle/>
+          <a:p>
+            <a:pPr algn="ctr"/>
+            <a:endParaRPr lang="en-US"/>
+          </a:p>
+        </p:txBody>
+      </p:sp>
+      <p:sp>
+        <p:nvSpPr>
+          <p:cNvPr id="9" name="Freeform: Shape 8">
+            <a:extLst>
+              <a:ext uri="{FF2B5EF4-FFF2-40B4-BE49-F238E27FC236}">
+                <a16:creationId xmlns:a16="http://schemas.microsoft.com/office/drawing/2014/main" id="{9ADA90AB-4E7C-4C8B-B0B5-41B2848ACD7B}"/>
+              </a:ext>
+            </a:extLst>
+          </p:cNvPr>
+          <p:cNvSpPr/>
+          <p:nvPr/>
+        </p:nvSpPr>
+        <p:spPr>
+          <a:xfrm>
+            <a:off x="1813560" y="4282440"/>
+            <a:ext cx="2621280" cy="624840"/>
+          </a:xfrm>
+          <a:custGeom>
+            <a:avLst/>
+            <a:gdLst>
+              <a:gd name="connsiteX0" fmla="*/ 2621280 w 2621280"/>
+              <a:gd name="connsiteY0" fmla="*/ 0 h 624840"/>
+              <a:gd name="connsiteX1" fmla="*/ 2118360 w 2621280"/>
+              <a:gd name="connsiteY1" fmla="*/ 449580 h 624840"/>
+              <a:gd name="connsiteX2" fmla="*/ 762000 w 2621280"/>
+              <a:gd name="connsiteY2" fmla="*/ 396240 h 624840"/>
+              <a:gd name="connsiteX3" fmla="*/ 0 w 2621280"/>
+              <a:gd name="connsiteY3" fmla="*/ 624840 h 624840"/>
+            </a:gdLst>
+            <a:ahLst/>
+            <a:cxnLst>
+              <a:cxn ang="0">
+                <a:pos x="connsiteX0" y="connsiteY0"/>
+              </a:cxn>
+              <a:cxn ang="0">
+                <a:pos x="connsiteX1" y="connsiteY1"/>
+              </a:cxn>
+              <a:cxn ang="0">
+                <a:pos x="connsiteX2" y="connsiteY2"/>
+              </a:cxn>
+              <a:cxn ang="0">
+                <a:pos x="connsiteX3" y="connsiteY3"/>
+              </a:cxn>
+            </a:cxnLst>
+            <a:rect l="l" t="t" r="r" b="b"/>
+            <a:pathLst>
+              <a:path w="2621280" h="624840">
+                <a:moveTo>
+                  <a:pt x="2621280" y="0"/>
+                </a:moveTo>
+                <a:cubicBezTo>
+                  <a:pt x="2524760" y="191770"/>
+                  <a:pt x="2428240" y="383540"/>
+                  <a:pt x="2118360" y="449580"/>
+                </a:cubicBezTo>
+                <a:cubicBezTo>
+                  <a:pt x="1808480" y="515620"/>
+                  <a:pt x="1115060" y="367030"/>
+                  <a:pt x="762000" y="396240"/>
+                </a:cubicBezTo>
+                <a:cubicBezTo>
+                  <a:pt x="408940" y="425450"/>
+                  <a:pt x="204470" y="525145"/>
+                  <a:pt x="0" y="624840"/>
+                </a:cubicBezTo>
+              </a:path>
+            </a:pathLst>
+          </a:custGeom>
+          <a:ln w="38100"/>
+        </p:spPr>
+        <p:style>
+          <a:lnRef idx="1">
+            <a:schemeClr val="dk1"/>
+          </a:lnRef>
+          <a:fillRef idx="0">
+            <a:schemeClr val="dk1"/>
+          </a:fillRef>
+          <a:effectRef idx="0">
+            <a:schemeClr val="dk1"/>
+          </a:effectRef>
+          <a:fontRef idx="minor">
+            <a:schemeClr val="tx1"/>
+          </a:fontRef>
+        </p:style>
+        <p:txBody>
+          <a:bodyPr rtlCol="0" anchor="ctr"/>
+          <a:lstStyle/>
+          <a:p>
+            <a:pPr algn="ctr"/>
+            <a:endParaRPr lang="en-US"/>
+          </a:p>
+        </p:txBody>
+      </p:sp>
     </p:spTree>
     <p:extLst>
       <p:ext uri="{BB962C8B-B14F-4D97-AF65-F5344CB8AC3E}">

</xml_diff>